<commit_message>
ppt modositasa es minta
</commit_message>
<xml_diff>
--- a/PPT/Véradós-móka.pptx
+++ b/PPT/Véradós-móka.pptx
@@ -11,7 +11,11 @@
     <p:sldId id="259" r:id="rId5"/>
     <p:sldId id="260" r:id="rId6"/>
     <p:sldId id="261" r:id="rId7"/>
-    <p:sldId id="262" r:id="rId8"/>
+    <p:sldId id="265" r:id="rId8"/>
+    <p:sldId id="262" r:id="rId9"/>
+    <p:sldId id="267" r:id="rId10"/>
+    <p:sldId id="266" r:id="rId11"/>
+    <p:sldId id="268" r:id="rId12"/>
   </p:sldIdLst>
   <p:sldSz cx="12192000" cy="6858000"/>
   <p:notesSz cx="6858000" cy="9144000"/>
@@ -571,7 +575,7 @@
           <a:p>
             <a:fld id="{1DCCB247-CC9D-43E8-8C1E-5C029751819E}" type="datetimeFigureOut">
               <a:rPr lang="hu-HU" smtClean="0"/>
-              <a:t>2022. márc. 24.</a:t>
+              <a:t>2022. ápr. 3.</a:t>
             </a:fld>
             <a:endParaRPr lang="hu-HU"/>
           </a:p>
@@ -903,7 +907,7 @@
           <a:p>
             <a:fld id="{1DCCB247-CC9D-43E8-8C1E-5C029751819E}" type="datetimeFigureOut">
               <a:rPr lang="hu-HU" smtClean="0"/>
-              <a:t>2022. márc. 24.</a:t>
+              <a:t>2022. ápr. 3.</a:t>
             </a:fld>
             <a:endParaRPr lang="hu-HU"/>
           </a:p>
@@ -1099,7 +1103,7 @@
           <a:p>
             <a:fld id="{1DCCB247-CC9D-43E8-8C1E-5C029751819E}" type="datetimeFigureOut">
               <a:rPr lang="hu-HU" smtClean="0"/>
-              <a:t>2022. márc. 24.</a:t>
+              <a:t>2022. ápr. 3.</a:t>
             </a:fld>
             <a:endParaRPr lang="hu-HU"/>
           </a:p>
@@ -1369,7 +1373,7 @@
           <a:p>
             <a:fld id="{1DCCB247-CC9D-43E8-8C1E-5C029751819E}" type="datetimeFigureOut">
               <a:rPr lang="hu-HU" smtClean="0"/>
-              <a:t>2022. márc. 24.</a:t>
+              <a:t>2022. ápr. 3.</a:t>
             </a:fld>
             <a:endParaRPr lang="hu-HU"/>
           </a:p>
@@ -1797,7 +1801,7 @@
           <a:p>
             <a:fld id="{1DCCB247-CC9D-43E8-8C1E-5C029751819E}" type="datetimeFigureOut">
               <a:rPr lang="hu-HU" smtClean="0"/>
-              <a:t>2022. márc. 24.</a:t>
+              <a:t>2022. ápr. 3.</a:t>
             </a:fld>
             <a:endParaRPr lang="hu-HU"/>
           </a:p>
@@ -2347,7 +2351,7 @@
           <a:p>
             <a:fld id="{1DCCB247-CC9D-43E8-8C1E-5C029751819E}" type="datetimeFigureOut">
               <a:rPr lang="hu-HU" smtClean="0"/>
-              <a:t>2022. márc. 24.</a:t>
+              <a:t>2022. ápr. 3.</a:t>
             </a:fld>
             <a:endParaRPr lang="hu-HU"/>
           </a:p>
@@ -3137,7 +3141,7 @@
           <a:p>
             <a:fld id="{1DCCB247-CC9D-43E8-8C1E-5C029751819E}" type="datetimeFigureOut">
               <a:rPr lang="hu-HU" smtClean="0"/>
-              <a:t>2022. márc. 24.</a:t>
+              <a:t>2022. ápr. 3.</a:t>
             </a:fld>
             <a:endParaRPr lang="hu-HU"/>
           </a:p>
@@ -3316,7 +3320,7 @@
           <a:p>
             <a:fld id="{1DCCB247-CC9D-43E8-8C1E-5C029751819E}" type="datetimeFigureOut">
               <a:rPr lang="hu-HU" smtClean="0"/>
-              <a:t>2022. márc. 24.</a:t>
+              <a:t>2022. ápr. 3.</a:t>
             </a:fld>
             <a:endParaRPr lang="hu-HU"/>
           </a:p>
@@ -3500,7 +3504,7 @@
           <a:p>
             <a:fld id="{1DCCB247-CC9D-43E8-8C1E-5C029751819E}" type="datetimeFigureOut">
               <a:rPr lang="hu-HU" smtClean="0"/>
-              <a:t>2022. márc. 24.</a:t>
+              <a:t>2022. ápr. 3.</a:t>
             </a:fld>
             <a:endParaRPr lang="hu-HU"/>
           </a:p>
@@ -3675,7 +3679,7 @@
           <a:p>
             <a:fld id="{1DCCB247-CC9D-43E8-8C1E-5C029751819E}" type="datetimeFigureOut">
               <a:rPr lang="hu-HU" smtClean="0"/>
-              <a:t>2022. márc. 24.</a:t>
+              <a:t>2022. ápr. 3.</a:t>
             </a:fld>
             <a:endParaRPr lang="hu-HU"/>
           </a:p>
@@ -3925,7 +3929,7 @@
           <a:p>
             <a:fld id="{1DCCB247-CC9D-43E8-8C1E-5C029751819E}" type="datetimeFigureOut">
               <a:rPr lang="hu-HU" smtClean="0"/>
-              <a:t>2022. márc. 24.</a:t>
+              <a:t>2022. ápr. 3.</a:t>
             </a:fld>
             <a:endParaRPr lang="hu-HU"/>
           </a:p>
@@ -4162,7 +4166,7 @@
           <a:p>
             <a:fld id="{1DCCB247-CC9D-43E8-8C1E-5C029751819E}" type="datetimeFigureOut">
               <a:rPr lang="hu-HU" smtClean="0"/>
-              <a:t>2022. márc. 24.</a:t>
+              <a:t>2022. ápr. 3.</a:t>
             </a:fld>
             <a:endParaRPr lang="hu-HU"/>
           </a:p>
@@ -4547,7 +4551,7 @@
           <a:p>
             <a:fld id="{1DCCB247-CC9D-43E8-8C1E-5C029751819E}" type="datetimeFigureOut">
               <a:rPr lang="hu-HU" smtClean="0"/>
-              <a:t>2022. márc. 24.</a:t>
+              <a:t>2022. ápr. 3.</a:t>
             </a:fld>
             <a:endParaRPr lang="hu-HU"/>
           </a:p>
@@ -4665,7 +4669,7 @@
           <a:p>
             <a:fld id="{1DCCB247-CC9D-43E8-8C1E-5C029751819E}" type="datetimeFigureOut">
               <a:rPr lang="hu-HU" smtClean="0"/>
-              <a:t>2022. márc. 24.</a:t>
+              <a:t>2022. ápr. 3.</a:t>
             </a:fld>
             <a:endParaRPr lang="hu-HU"/>
           </a:p>
@@ -4760,7 +4764,7 @@
           <a:p>
             <a:fld id="{1DCCB247-CC9D-43E8-8C1E-5C029751819E}" type="datetimeFigureOut">
               <a:rPr lang="hu-HU" smtClean="0"/>
-              <a:t>2022. márc. 24.</a:t>
+              <a:t>2022. ápr. 3.</a:t>
             </a:fld>
             <a:endParaRPr lang="hu-HU"/>
           </a:p>
@@ -5013,7 +5017,7 @@
           <a:p>
             <a:fld id="{1DCCB247-CC9D-43E8-8C1E-5C029751819E}" type="datetimeFigureOut">
               <a:rPr lang="hu-HU" smtClean="0"/>
-              <a:t>2022. márc. 24.</a:t>
+              <a:t>2022. ápr. 3.</a:t>
             </a:fld>
             <a:endParaRPr lang="hu-HU"/>
           </a:p>
@@ -5282,7 +5286,7 @@
           <a:p>
             <a:fld id="{1DCCB247-CC9D-43E8-8C1E-5C029751819E}" type="datetimeFigureOut">
               <a:rPr lang="hu-HU" smtClean="0"/>
-              <a:t>2022. márc. 24.</a:t>
+              <a:t>2022. ápr. 3.</a:t>
             </a:fld>
             <a:endParaRPr lang="hu-HU"/>
           </a:p>
@@ -5685,7 +5689,7 @@
           <a:p>
             <a:fld id="{1DCCB247-CC9D-43E8-8C1E-5C029751819E}" type="datetimeFigureOut">
               <a:rPr lang="hu-HU" smtClean="0"/>
-              <a:t>2022. márc. 24.</a:t>
+              <a:t>2022. ápr. 3.</a:t>
             </a:fld>
             <a:endParaRPr lang="hu-HU"/>
           </a:p>
@@ -6227,6 +6231,216 @@
 </p:sld>
 </file>
 
+<file path=ppt/slides/slide10.xml><?xml version="1.0" encoding="utf-8"?>
+<p:sld xmlns:a="http://schemas.openxmlformats.org/drawingml/2006/main" xmlns:r="http://schemas.openxmlformats.org/officeDocument/2006/relationships" xmlns:p="http://schemas.openxmlformats.org/presentationml/2006/main">
+  <p:cSld>
+    <p:spTree>
+      <p:nvGrpSpPr>
+        <p:cNvPr id="1" name=""/>
+        <p:cNvGrpSpPr/>
+        <p:nvPr/>
+      </p:nvGrpSpPr>
+      <p:grpSpPr>
+        <a:xfrm>
+          <a:off x="0" y="0"/>
+          <a:ext cx="0" cy="0"/>
+          <a:chOff x="0" y="0"/>
+          <a:chExt cx="0" cy="0"/>
+        </a:xfrm>
+      </p:grpSpPr>
+      <p:sp>
+        <p:nvSpPr>
+          <p:cNvPr id="2" name="Cím 1"/>
+          <p:cNvSpPr>
+            <a:spLocks noGrp="1"/>
+          </p:cNvSpPr>
+          <p:nvPr>
+            <p:ph type="title"/>
+          </p:nvPr>
+        </p:nvSpPr>
+        <p:spPr>
+          <a:xfrm>
+            <a:off x="685800" y="685800"/>
+            <a:ext cx="10396882" cy="1151965"/>
+          </a:xfrm>
+        </p:spPr>
+        <p:txBody>
+          <a:bodyPr/>
+          <a:lstStyle/>
+          <a:p>
+            <a:r>
+              <a:rPr lang="hu-HU" dirty="0" err="1"/>
+              <a:t>Github</a:t>
+            </a:r>
+            <a:endParaRPr lang="hu-HU" dirty="0"/>
+          </a:p>
+        </p:txBody>
+      </p:sp>
+      <p:sp>
+        <p:nvSpPr>
+          <p:cNvPr id="4" name="Tartalom helye 3">
+            <a:extLst>
+              <a:ext uri="{FF2B5EF4-FFF2-40B4-BE49-F238E27FC236}">
+                <a16:creationId xmlns:a16="http://schemas.microsoft.com/office/drawing/2014/main" id="{6546C249-7D9D-4A0A-B536-48E9E887DDE0}"/>
+              </a:ext>
+            </a:extLst>
+          </p:cNvPr>
+          <p:cNvSpPr>
+            <a:spLocks noGrp="1"/>
+          </p:cNvSpPr>
+          <p:nvPr>
+            <p:ph sz="quarter" idx="13"/>
+          </p:nvPr>
+        </p:nvSpPr>
+        <p:spPr/>
+        <p:txBody>
+          <a:bodyPr/>
+          <a:lstStyle/>
+          <a:p>
+            <a:r>
+              <a:rPr lang="en-US" dirty="0"/>
+              <a:t>https://github.com/Tepertvau/ProjektFeladat</a:t>
+            </a:r>
+          </a:p>
+        </p:txBody>
+      </p:sp>
+    </p:spTree>
+    <p:extLst>
+      <p:ext uri="{BB962C8B-B14F-4D97-AF65-F5344CB8AC3E}">
+        <p14:creationId xmlns:p14="http://schemas.microsoft.com/office/powerpoint/2010/main" val="204795511"/>
+      </p:ext>
+    </p:extLst>
+  </p:cSld>
+  <p:clrMapOvr>
+    <a:masterClrMapping/>
+  </p:clrMapOvr>
+</p:sld>
+</file>
+
+<file path=ppt/slides/slide11.xml><?xml version="1.0" encoding="utf-8"?>
+<p:sld xmlns:a="http://schemas.openxmlformats.org/drawingml/2006/main" xmlns:r="http://schemas.openxmlformats.org/officeDocument/2006/relationships" xmlns:p="http://schemas.openxmlformats.org/presentationml/2006/main">
+  <p:cSld>
+    <p:spTree>
+      <p:nvGrpSpPr>
+        <p:cNvPr id="1" name=""/>
+        <p:cNvGrpSpPr/>
+        <p:nvPr/>
+      </p:nvGrpSpPr>
+      <p:grpSpPr>
+        <a:xfrm>
+          <a:off x="0" y="0"/>
+          <a:ext cx="0" cy="0"/>
+          <a:chOff x="0" y="0"/>
+          <a:chExt cx="0" cy="0"/>
+        </a:xfrm>
+      </p:grpSpPr>
+      <p:sp>
+        <p:nvSpPr>
+          <p:cNvPr id="2" name="Cím 1">
+            <a:extLst>
+              <a:ext uri="{FF2B5EF4-FFF2-40B4-BE49-F238E27FC236}">
+                <a16:creationId xmlns:a16="http://schemas.microsoft.com/office/drawing/2014/main" id="{97C47809-25A7-4EF7-83E3-41D257667127}"/>
+              </a:ext>
+            </a:extLst>
+          </p:cNvPr>
+          <p:cNvSpPr>
+            <a:spLocks noGrp="1"/>
+          </p:cNvSpPr>
+          <p:nvPr>
+            <p:ph type="ctrTitle"/>
+          </p:nvPr>
+        </p:nvSpPr>
+        <p:spPr/>
+        <p:txBody>
+          <a:bodyPr/>
+          <a:lstStyle/>
+          <a:p>
+            <a:r>
+              <a:rPr lang="hu-HU" dirty="0"/>
+              <a:t>Köszönjük a figyelmet!</a:t>
+            </a:r>
+            <a:endParaRPr lang="en-US" dirty="0"/>
+          </a:p>
+        </p:txBody>
+      </p:sp>
+      <p:sp>
+        <p:nvSpPr>
+          <p:cNvPr id="3" name="Alcím 2">
+            <a:extLst>
+              <a:ext uri="{FF2B5EF4-FFF2-40B4-BE49-F238E27FC236}">
+                <a16:creationId xmlns:a16="http://schemas.microsoft.com/office/drawing/2014/main" id="{B2B647AE-CC42-4516-9D7D-5697283C932A}"/>
+              </a:ext>
+            </a:extLst>
+          </p:cNvPr>
+          <p:cNvSpPr>
+            <a:spLocks noGrp="1"/>
+          </p:cNvSpPr>
+          <p:nvPr>
+            <p:ph type="subTitle" idx="1"/>
+          </p:nvPr>
+        </p:nvSpPr>
+        <p:spPr/>
+        <p:txBody>
+          <a:bodyPr/>
+          <a:lstStyle/>
+          <a:p>
+            <a:r>
+              <a:rPr lang="hu-HU" sz="2400" dirty="0"/>
+              <a:t>Juhász Attila, Kovács </a:t>
+            </a:r>
+            <a:r>
+              <a:rPr lang="hu-HU" sz="2400" dirty="0" err="1"/>
+              <a:t>norbert</a:t>
+            </a:r>
+            <a:r>
+              <a:rPr lang="hu-HU" sz="2400" dirty="0"/>
+              <a:t> </a:t>
+            </a:r>
+            <a:r>
+              <a:rPr lang="hu-HU" sz="2400" dirty="0" err="1"/>
+              <a:t>richárd</a:t>
+            </a:r>
+            <a:r>
+              <a:rPr lang="hu-HU" sz="2400" dirty="0"/>
+              <a:t>, Jármi </a:t>
+            </a:r>
+            <a:r>
+              <a:rPr lang="hu-HU" sz="2400" dirty="0" err="1"/>
+              <a:t>krisztián</a:t>
+            </a:r>
+            <a:r>
+              <a:rPr lang="hu-HU" sz="2400" dirty="0"/>
+              <a:t>, </a:t>
+            </a:r>
+            <a:r>
+              <a:rPr lang="hu-HU" sz="2400" dirty="0" err="1"/>
+              <a:t>zsiros</a:t>
+            </a:r>
+            <a:r>
+              <a:rPr lang="hu-HU" sz="2400" dirty="0"/>
+              <a:t> </a:t>
+            </a:r>
+            <a:r>
+              <a:rPr lang="hu-HU" sz="2400" dirty="0" err="1"/>
+              <a:t>ákos</a:t>
+            </a:r>
+            <a:endParaRPr lang="en-US" sz="2400" dirty="0"/>
+          </a:p>
+        </p:txBody>
+      </p:sp>
+    </p:spTree>
+    <p:extLst>
+      <p:ext uri="{BB962C8B-B14F-4D97-AF65-F5344CB8AC3E}">
+        <p14:creationId xmlns:p14="http://schemas.microsoft.com/office/powerpoint/2010/main" val="991347426"/>
+      </p:ext>
+    </p:extLst>
+  </p:cSld>
+  <p:clrMapOvr>
+    <a:masterClrMapping/>
+  </p:clrMapOvr>
+</p:sld>
+</file>
+
 <file path=ppt/slides/slide2.xml><?xml version="1.0" encoding="utf-8"?>
 <p:sld xmlns:a="http://schemas.openxmlformats.org/drawingml/2006/main" xmlns:r="http://schemas.openxmlformats.org/officeDocument/2006/relationships" xmlns:p="http://schemas.openxmlformats.org/presentationml/2006/main">
   <p:cSld>
@@ -6439,45 +6653,31 @@
       </p:sp>
       <p:pic>
         <p:nvPicPr>
-          <p:cNvPr id="1026" name="Picture 2" descr="https://cdn.discordapp.com/attachments/471370960705159168/955102143558336562/unknown.png"/>
+          <p:cNvPr id="5" name="Tartalom helye 4">
+            <a:extLst>
+              <a:ext uri="{FF2B5EF4-FFF2-40B4-BE49-F238E27FC236}">
+                <a16:creationId xmlns:a16="http://schemas.microsoft.com/office/drawing/2014/main" id="{E85B7CF1-D7C5-497D-9459-013CDD4D8A2A}"/>
+              </a:ext>
+            </a:extLst>
+          </p:cNvPr>
           <p:cNvPicPr>
-            <a:picLocks noGrp="1" noChangeAspect="1" noChangeArrowheads="1"/>
+            <a:picLocks noGrp="1" noChangeAspect="1"/>
           </p:cNvPicPr>
           <p:nvPr>
             <p:ph sz="quarter" idx="13"/>
           </p:nvPr>
         </p:nvPicPr>
         <p:blipFill>
-          <a:blip r:embed="rId2" cstate="print">
-            <a:extLst>
-              <a:ext uri="{28A0092B-C50C-407E-A947-70E740481C1C}">
-                <a14:useLocalDpi xmlns:a14="http://schemas.microsoft.com/office/drawing/2010/main" val="0"/>
-              </a:ext>
-            </a:extLst>
-          </a:blip>
-          <a:srcRect/>
+          <a:blip r:embed="rId2"/>
           <a:stretch>
             <a:fillRect/>
           </a:stretch>
         </p:blipFill>
-        <p:spPr bwMode="auto">
+        <p:spPr>
           <a:xfrm>
-            <a:off x="2967126" y="2063750"/>
-            <a:ext cx="5832297" cy="3311525"/>
+            <a:off x="2981197" y="2072986"/>
+            <a:ext cx="5804156" cy="3311525"/>
           </a:xfrm>
-          <a:prstGeom prst="rect">
-            <a:avLst/>
-          </a:prstGeom>
-          <a:noFill/>
-          <a:extLst>
-            <a:ext uri="{909E8E84-426E-40DD-AFC4-6F175D3DCCD1}">
-              <a14:hiddenFill xmlns:a14="http://schemas.microsoft.com/office/drawing/2010/main">
-                <a:solidFill>
-                  <a:srgbClr val="FFFFFF"/>
-                </a:solidFill>
-              </a14:hiddenFill>
-            </a:ext>
-          </a:extLst>
         </p:spPr>
       </p:pic>
     </p:spTree>
@@ -6536,10 +6736,10 @@
       </p:sp>
       <p:pic>
         <p:nvPicPr>
-          <p:cNvPr id="7" name="Tartalom helye 6">
+          <p:cNvPr id="6" name="Tartalom helye 5">
             <a:extLst>
               <a:ext uri="{FF2B5EF4-FFF2-40B4-BE49-F238E27FC236}">
-                <a16:creationId xmlns:a16="http://schemas.microsoft.com/office/drawing/2014/main" id="{B5BD527C-2EF0-42C8-B54F-85C99629B0EC}"/>
+                <a16:creationId xmlns:a16="http://schemas.microsoft.com/office/drawing/2014/main" id="{3573BC66-81A5-4F64-9E3C-60BC5AB0DA84}"/>
               </a:ext>
             </a:extLst>
           </p:cNvPr>
@@ -6558,8 +6758,8 @@
         </p:blipFill>
         <p:spPr>
           <a:xfrm>
-            <a:off x="2983691" y="2063750"/>
-            <a:ext cx="5799168" cy="3311525"/>
+            <a:off x="2982204" y="2063750"/>
+            <a:ext cx="5802142" cy="3311525"/>
           </a:xfrm>
         </p:spPr>
       </p:pic>
@@ -6619,10 +6819,10 @@
       </p:sp>
       <p:pic>
         <p:nvPicPr>
-          <p:cNvPr id="5" name="Tartalom helye 4">
+          <p:cNvPr id="9" name="Tartalom helye 8">
             <a:extLst>
               <a:ext uri="{FF2B5EF4-FFF2-40B4-BE49-F238E27FC236}">
-                <a16:creationId xmlns:a16="http://schemas.microsoft.com/office/drawing/2014/main" id="{5A58D45F-9546-477E-9085-96E60CA899CC}"/>
+                <a16:creationId xmlns:a16="http://schemas.microsoft.com/office/drawing/2014/main" id="{47E07B5E-8D1D-4CE0-BE46-B9133C4BA114}"/>
               </a:ext>
             </a:extLst>
           </p:cNvPr>
@@ -6641,8 +6841,8 @@
         </p:blipFill>
         <p:spPr>
           <a:xfrm>
-            <a:off x="2981197" y="2063750"/>
-            <a:ext cx="5804156" cy="3311525"/>
+            <a:off x="2979691" y="2063750"/>
+            <a:ext cx="5807167" cy="3311525"/>
           </a:xfrm>
         </p:spPr>
       </p:pic>
@@ -6688,6 +6888,89 @@
         </p:nvSpPr>
         <p:spPr/>
         <p:txBody>
+          <a:bodyPr>
+            <a:normAutofit fontScale="90000"/>
+          </a:bodyPr>
+          <a:lstStyle/>
+          <a:p>
+            <a:r>
+              <a:rPr lang="hu-HU" dirty="0"/>
+              <a:t>A korházi adatok oldala					</a:t>
+            </a:r>
+          </a:p>
+        </p:txBody>
+      </p:sp>
+      <p:pic>
+        <p:nvPicPr>
+          <p:cNvPr id="7" name="Tartalom helye 6">
+            <a:extLst>
+              <a:ext uri="{FF2B5EF4-FFF2-40B4-BE49-F238E27FC236}">
+                <a16:creationId xmlns:a16="http://schemas.microsoft.com/office/drawing/2014/main" id="{93FE600D-5BA1-49C6-A764-A38B9193752C}"/>
+              </a:ext>
+            </a:extLst>
+          </p:cNvPr>
+          <p:cNvPicPr>
+            <a:picLocks noGrp="1" noChangeAspect="1"/>
+          </p:cNvPicPr>
+          <p:nvPr>
+            <p:ph sz="quarter" idx="13"/>
+          </p:nvPr>
+        </p:nvPicPr>
+        <p:blipFill>
+          <a:blip r:embed="rId2"/>
+          <a:stretch>
+            <a:fillRect/>
+          </a:stretch>
+        </p:blipFill>
+        <p:spPr>
+          <a:xfrm>
+            <a:off x="2971693" y="2063750"/>
+            <a:ext cx="5823164" cy="3311525"/>
+          </a:xfrm>
+        </p:spPr>
+      </p:pic>
+    </p:spTree>
+    <p:extLst>
+      <p:ext uri="{BB962C8B-B14F-4D97-AF65-F5344CB8AC3E}">
+        <p14:creationId xmlns:p14="http://schemas.microsoft.com/office/powerpoint/2010/main" val="474520372"/>
+      </p:ext>
+    </p:extLst>
+  </p:cSld>
+  <p:clrMapOvr>
+    <a:masterClrMapping/>
+  </p:clrMapOvr>
+</p:sld>
+</file>
+
+<file path=ppt/slides/slide8.xml><?xml version="1.0" encoding="utf-8"?>
+<p:sld xmlns:a="http://schemas.openxmlformats.org/drawingml/2006/main" xmlns:r="http://schemas.openxmlformats.org/officeDocument/2006/relationships" xmlns:p="http://schemas.openxmlformats.org/presentationml/2006/main">
+  <p:cSld>
+    <p:spTree>
+      <p:nvGrpSpPr>
+        <p:cNvPr id="1" name=""/>
+        <p:cNvGrpSpPr/>
+        <p:nvPr/>
+      </p:nvGrpSpPr>
+      <p:grpSpPr>
+        <a:xfrm>
+          <a:off x="0" y="0"/>
+          <a:ext cx="0" cy="0"/>
+          <a:chOff x="0" y="0"/>
+          <a:chExt cx="0" cy="0"/>
+        </a:xfrm>
+      </p:grpSpPr>
+      <p:sp>
+        <p:nvSpPr>
+          <p:cNvPr id="2" name="Cím 1"/>
+          <p:cNvSpPr>
+            <a:spLocks noGrp="1"/>
+          </p:cNvSpPr>
+          <p:nvPr>
+            <p:ph type="title"/>
+          </p:nvPr>
+        </p:nvSpPr>
+        <p:spPr/>
+        <p:txBody>
           <a:bodyPr/>
           <a:lstStyle/>
           <a:p>
@@ -6737,6 +7020,87 @@
     <p:extLst>
       <p:ext uri="{BB962C8B-B14F-4D97-AF65-F5344CB8AC3E}">
         <p14:creationId xmlns:p14="http://schemas.microsoft.com/office/powerpoint/2010/main" val="3602281835"/>
+      </p:ext>
+    </p:extLst>
+  </p:cSld>
+  <p:clrMapOvr>
+    <a:masterClrMapping/>
+  </p:clrMapOvr>
+</p:sld>
+</file>
+
+<file path=ppt/slides/slide9.xml><?xml version="1.0" encoding="utf-8"?>
+<p:sld xmlns:a="http://schemas.openxmlformats.org/drawingml/2006/main" xmlns:r="http://schemas.openxmlformats.org/officeDocument/2006/relationships" xmlns:p="http://schemas.openxmlformats.org/presentationml/2006/main">
+  <p:cSld>
+    <p:spTree>
+      <p:nvGrpSpPr>
+        <p:cNvPr id="1" name=""/>
+        <p:cNvGrpSpPr/>
+        <p:nvPr/>
+      </p:nvGrpSpPr>
+      <p:grpSpPr>
+        <a:xfrm>
+          <a:off x="0" y="0"/>
+          <a:ext cx="0" cy="0"/>
+          <a:chOff x="0" y="0"/>
+          <a:chExt cx="0" cy="0"/>
+        </a:xfrm>
+      </p:grpSpPr>
+      <p:sp>
+        <p:nvSpPr>
+          <p:cNvPr id="2" name="Cím 1"/>
+          <p:cNvSpPr>
+            <a:spLocks noGrp="1"/>
+          </p:cNvSpPr>
+          <p:nvPr>
+            <p:ph type="title"/>
+          </p:nvPr>
+        </p:nvSpPr>
+        <p:spPr/>
+        <p:txBody>
+          <a:bodyPr/>
+          <a:lstStyle/>
+          <a:p>
+            <a:r>
+              <a:rPr lang="hu-HU" dirty="0" err="1"/>
+              <a:t>Trello</a:t>
+            </a:r>
+            <a:endParaRPr lang="hu-HU" dirty="0"/>
+          </a:p>
+        </p:txBody>
+      </p:sp>
+      <p:sp>
+        <p:nvSpPr>
+          <p:cNvPr id="4" name="Tartalom helye 3">
+            <a:extLst>
+              <a:ext uri="{FF2B5EF4-FFF2-40B4-BE49-F238E27FC236}">
+                <a16:creationId xmlns:a16="http://schemas.microsoft.com/office/drawing/2014/main" id="{11B3554B-F39C-4EC2-9AF2-B4FD91B90937}"/>
+              </a:ext>
+            </a:extLst>
+          </p:cNvPr>
+          <p:cNvSpPr>
+            <a:spLocks noGrp="1"/>
+          </p:cNvSpPr>
+          <p:nvPr>
+            <p:ph sz="quarter" idx="13"/>
+          </p:nvPr>
+        </p:nvSpPr>
+        <p:spPr/>
+        <p:txBody>
+          <a:bodyPr/>
+          <a:lstStyle/>
+          <a:p>
+            <a:r>
+              <a:rPr lang="en-US" dirty="0"/>
+              <a:t>https://trello.com/b/1UwqXdOu/v%C3%A9rad%C3%B3s-m%C3%B3ka</a:t>
+            </a:r>
+          </a:p>
+        </p:txBody>
+      </p:sp>
+    </p:spTree>
+    <p:extLst>
+      <p:ext uri="{BB962C8B-B14F-4D97-AF65-F5344CB8AC3E}">
+        <p14:creationId xmlns:p14="http://schemas.microsoft.com/office/powerpoint/2010/main" val="435857039"/>
       </p:ext>
     </p:extLst>
   </p:cSld>

</xml_diff>